<commit_message>
updated TransViz UE doc
</commit_message>
<xml_diff>
--- a/doc/UE/TransVizUE.pptx
+++ b/doc/UE/TransVizUE.pptx
@@ -111,6 +111,11 @@
       </a:defRPr>
     </a:lvl9pPr>
   </p:defaultTextStyle>
+  <p:extLst>
+    <p:ext uri="{EFAFB233-063F-42B5-8137-9DF3F51BA10A}">
+      <p15:sldGuideLst xmlns:p15="http://schemas.microsoft.com/office/powerpoint/2012/main"/>
+    </p:ext>
+  </p:extLst>
 </p:presentation>
 </file>
 
@@ -3024,8 +3029,8 @@
               <a:t>Implementation </a:t>
             </a:r>
             <a:r>
-              <a:rPr lang="en-US" sz="3200" dirty="0" err="1" smtClean="0"/>
-              <a:t>Detials</a:t>
+              <a:rPr lang="en-US" sz="3200" dirty="0" smtClean="0"/>
+              <a:t>Details</a:t>
             </a:r>
             <a:endParaRPr lang="en-US" sz="3200" dirty="0"/>
           </a:p>
@@ -3208,7 +3213,6 @@
               <a:rPr lang="en-US" dirty="0" smtClean="0"/>
               <a:t>Preliminary</a:t>
             </a:r>
-            <a:endParaRPr lang="en-US" dirty="0" smtClean="0"/>
           </a:p>
         </p:txBody>
       </p:sp>
@@ -3325,7 +3329,7 @@
         <p:spPr/>
         <p:txBody>
           <a:bodyPr>
-            <a:normAutofit fontScale="92500" lnSpcReduction="20000"/>
+            <a:normAutofit fontScale="85000" lnSpcReduction="20000"/>
           </a:bodyPr>
           <a:lstStyle/>
           <a:p>
@@ -3360,12 +3364,36 @@
           <a:p>
             <a:pPr lvl="1"/>
             <a:r>
+              <a:rPr lang="en-US" dirty="0" smtClean="0"/>
+              <a:t>Callback Interface class that is used in application to get </a:t>
+            </a:r>
+            <a:r>
+              <a:rPr lang="en-US" dirty="0" err="1" smtClean="0"/>
+              <a:t>TransVizGeom</a:t>
+            </a:r>
+            <a:r>
+              <a:rPr lang="en-US" dirty="0" smtClean="0"/>
+              <a:t>. Refer to </a:t>
+            </a:r>
+            <a:r>
+              <a:rPr lang="en-US" dirty="0" err="1" smtClean="0"/>
+              <a:t>UETestApp</a:t>
+            </a:r>
+            <a:r>
+              <a:rPr lang="en-US" dirty="0" smtClean="0"/>
+              <a:t> for usage.</a:t>
+            </a:r>
+            <a:endParaRPr lang="en-US" dirty="0" smtClean="0"/>
+          </a:p>
+          <a:p>
+            <a:pPr lvl="1"/>
+            <a:r>
               <a:rPr lang="en-US" dirty="0" err="1" smtClean="0"/>
               <a:t>GeomObj</a:t>
             </a:r>
             <a:r>
               <a:rPr lang="en-US" dirty="0" smtClean="0"/>
-              <a:t> returns </a:t>
+              <a:t>() returns </a:t>
             </a:r>
             <a:r>
               <a:rPr lang="en-US" dirty="0" err="1" smtClean="0"/>
@@ -3379,15 +3407,30 @@
           <a:p>
             <a:r>
               <a:rPr lang="en-US" dirty="0" err="1" smtClean="0"/>
+              <a:t>Struct</a:t>
+            </a:r>
+            <a:r>
+              <a:rPr lang="en-US" dirty="0" smtClean="0"/>
+              <a:t> </a:t>
+            </a:r>
+            <a:r>
+              <a:rPr lang="en-US" dirty="0" err="1" smtClean="0"/>
               <a:t>TransVizGeom</a:t>
             </a:r>
-            <a:endParaRPr lang="en-US" dirty="0" smtClean="0"/>
+            <a:r>
+              <a:rPr lang="en-US" dirty="0" smtClean="0"/>
+              <a:t> </a:t>
+            </a:r>
           </a:p>
           <a:p>
             <a:pPr lvl="1"/>
             <a:r>
               <a:rPr lang="en-US" dirty="0" smtClean="0"/>
-              <a:t>Structure in which </a:t>
+              <a:t>Structure </a:t>
+            </a:r>
+            <a:r>
+              <a:rPr lang="en-US" dirty="0" smtClean="0"/>
+              <a:t>in which </a:t>
             </a:r>
             <a:r>
               <a:rPr lang="en-US" dirty="0" err="1" smtClean="0"/>
@@ -3583,24 +3626,62 @@
               <a:rPr lang="en-US" dirty="0" smtClean="0"/>
               <a:t>Mesh Generation</a:t>
             </a:r>
+          </a:p>
+          <a:p>
+            <a:pPr lvl="1"/>
+            <a:r>
+              <a:rPr lang="en-US" dirty="0" err="1" smtClean="0"/>
+              <a:t>TransVizCB</a:t>
+            </a:r>
+            <a:r>
+              <a:rPr lang="en-US" dirty="0" smtClean="0"/>
+              <a:t>	</a:t>
+            </a:r>
+          </a:p>
+          <a:p>
+            <a:pPr lvl="2"/>
+            <a:r>
+              <a:rPr lang="en-US" dirty="0" smtClean="0"/>
+              <a:t>Receives </a:t>
+            </a:r>
+            <a:r>
+              <a:rPr lang="en-US" dirty="0" err="1" smtClean="0"/>
+              <a:t>TransVizGeom</a:t>
+            </a:r>
+            <a:r>
+              <a:rPr lang="en-US" dirty="0" smtClean="0"/>
+              <a:t> from TV library</a:t>
+            </a:r>
+            <a:endParaRPr lang="en-US" dirty="0"/>
+          </a:p>
+          <a:p>
+            <a:pPr lvl="1"/>
+            <a:r>
+              <a:rPr lang="en-US" dirty="0" err="1" smtClean="0"/>
+              <a:t>TVActor</a:t>
+            </a:r>
             <a:endParaRPr lang="en-US" dirty="0" smtClean="0"/>
           </a:p>
           <a:p>
-            <a:pPr lvl="1"/>
-            <a:r>
-              <a:rPr lang="en-US" dirty="0" err="1" smtClean="0"/>
-              <a:t>TransVizCB</a:t>
-            </a:r>
-            <a:r>
-              <a:rPr lang="en-US" dirty="0" smtClean="0"/>
-              <a:t>	</a:t>
-            </a:r>
-          </a:p>
-          <a:p>
             <a:pPr lvl="2"/>
             <a:r>
               <a:rPr lang="en-US" dirty="0" smtClean="0"/>
-              <a:t>Receives </a:t>
+              <a:t>The TV server code fires up in actors </a:t>
+            </a:r>
+            <a:r>
+              <a:rPr lang="en-US" dirty="0" err="1" smtClean="0"/>
+              <a:t>beginplay</a:t>
+            </a:r>
+            <a:r>
+              <a:rPr lang="en-US" dirty="0" smtClean="0"/>
+              <a:t>() function</a:t>
+            </a:r>
+          </a:p>
+          <a:p>
+            <a:pPr lvl="2"/>
+            <a:r>
+              <a:rPr lang="en-US" dirty="0" smtClean="0"/>
+              <a:t>After receiving the </a:t>
             </a:r>
             <a:r>
               <a:rPr lang="en-US" dirty="0" err="1" smtClean="0"/>
@@ -3608,48 +3689,8 @@
             </a:r>
             <a:r>
               <a:rPr lang="en-US" dirty="0" smtClean="0"/>
-              <a:t> from TV library</a:t>
-            </a:r>
-            <a:endParaRPr lang="en-US" dirty="0"/>
-          </a:p>
-          <a:p>
-            <a:pPr lvl="1"/>
-            <a:r>
-              <a:rPr lang="en-US" dirty="0" err="1" smtClean="0"/>
-              <a:t>TVActor</a:t>
-            </a:r>
-            <a:endParaRPr lang="en-US" dirty="0" smtClean="0"/>
-          </a:p>
-          <a:p>
-            <a:pPr lvl="2"/>
-            <a:r>
-              <a:rPr lang="en-US" dirty="0" smtClean="0"/>
-              <a:t>The TV server code fires up in actors </a:t>
-            </a:r>
-            <a:r>
-              <a:rPr lang="en-US" dirty="0" err="1" smtClean="0"/>
-              <a:t>beginplay</a:t>
-            </a:r>
-            <a:r>
-              <a:rPr lang="en-US" dirty="0" smtClean="0"/>
-              <a:t>() function</a:t>
-            </a:r>
-          </a:p>
-          <a:p>
-            <a:pPr lvl="2"/>
-            <a:r>
-              <a:rPr lang="en-US" dirty="0" smtClean="0"/>
-              <a:t>After receiving the </a:t>
-            </a:r>
-            <a:r>
-              <a:rPr lang="en-US" dirty="0" err="1" smtClean="0"/>
-              <a:t>TransVizGeom</a:t>
-            </a:r>
-            <a:r>
-              <a:rPr lang="en-US" dirty="0" smtClean="0"/>
               <a:t> the actor converts it to Procedural Mesh. Procedural Mesh needs triangle indexes. This is computed using vertex mode. While vertex and Normal are passed as they are.</a:t>
             </a:r>
-            <a:endParaRPr lang="en-US" dirty="0" smtClean="0"/>
           </a:p>
           <a:p>
             <a:pPr lvl="2"/>
@@ -3747,7 +3788,6 @@
               <a:rPr lang="en-US" dirty="0" smtClean="0"/>
               <a:t>Material</a:t>
             </a:r>
-            <a:endParaRPr lang="en-US" dirty="0" smtClean="0"/>
           </a:p>
           <a:p>
             <a:pPr lvl="1"/>
@@ -3943,6 +3983,10 @@
               <a:rPr lang="en-US" dirty="0" err="1" smtClean="0"/>
               <a:t>DrawNetProcMesh</a:t>
             </a:r>
+            <a:r>
+              <a:rPr lang="en-US" dirty="0" smtClean="0"/>
+              <a:t>()</a:t>
+            </a:r>
             <a:endParaRPr lang="en-US" dirty="0" smtClean="0"/>
           </a:p>
           <a:p>
@@ -3961,15 +4005,12 @@
             </a:r>
             <a:r>
               <a:rPr lang="en-US" dirty="0" smtClean="0"/>
-              <a:t>is important to replicate actor at all the UE’s multiplayers node</a:t>
-            </a:r>
-          </a:p>
-          <a:p>
-            <a:pPr marL="685800" lvl="2">
-              <a:spcBef>
-                <a:spcPts val="1000"/>
-              </a:spcBef>
-            </a:pPr>
+              <a:t>is important to replicate actor at all the UE’s multiplayers </a:t>
+            </a:r>
+            <a:r>
+              <a:rPr lang="en-US" dirty="0" smtClean="0"/>
+              <a:t>node</a:t>
+            </a:r>
             <a:endParaRPr lang="en-US" dirty="0" smtClean="0"/>
           </a:p>
           <a:p>
@@ -4101,7 +4142,15 @@
             </a:pPr>
             <a:r>
               <a:rPr lang="en-US" dirty="0" smtClean="0"/>
-              <a:t>Build and Install the Project in Release mode. Debug mode doesn’t works with UE. </a:t>
+              <a:t>Build and Install the Project in Release mode. Debug mode doesn’t </a:t>
+            </a:r>
+            <a:r>
+              <a:rPr lang="en-US" dirty="0" smtClean="0"/>
+              <a:t>work </a:t>
+            </a:r>
+            <a:r>
+              <a:rPr lang="en-US" dirty="0" smtClean="0"/>
+              <a:t>with UE. </a:t>
             </a:r>
           </a:p>
           <a:p>
@@ -4112,9 +4161,29 @@
             </a:pPr>
             <a:r>
               <a:rPr lang="en-US" dirty="0" smtClean="0"/>
-              <a:t>Build folder containing the library will be generated</a:t>
-            </a:r>
-            <a:endParaRPr lang="en-US" dirty="0"/>
+              <a:t>Build folder </a:t>
+            </a:r>
+            <a:r>
+              <a:rPr lang="en-US" dirty="0" smtClean="0"/>
+              <a:t>contains </a:t>
+            </a:r>
+            <a:r>
+              <a:rPr lang="en-US" dirty="0" smtClean="0"/>
+              <a:t>the </a:t>
+            </a:r>
+            <a:r>
+              <a:rPr lang="en-US" dirty="0"/>
+              <a:t>generated </a:t>
+            </a:r>
+            <a:r>
+              <a:rPr lang="en-US" dirty="0" err="1" smtClean="0"/>
+              <a:t>TransViz</a:t>
+            </a:r>
+            <a:r>
+              <a:rPr lang="en-US" dirty="0" smtClean="0"/>
+              <a:t> library. </a:t>
+            </a:r>
+            <a:endParaRPr lang="en-US" dirty="0" smtClean="0"/>
           </a:p>
           <a:p>
             <a:pPr marL="228600" lvl="1">
@@ -4124,7 +4193,7 @@
             </a:pPr>
             <a:r>
               <a:rPr lang="en-US" dirty="0" smtClean="0"/>
-              <a:t>UE</a:t>
+              <a:t>UE (4.22)</a:t>
             </a:r>
           </a:p>
           <a:p>
@@ -4135,7 +4204,11 @@
             </a:pPr>
             <a:r>
               <a:rPr lang="en-US" dirty="0" smtClean="0"/>
-              <a:t>Copy the content of Build folder to &lt;</a:t>
+              <a:t>Copy </a:t>
+            </a:r>
+            <a:r>
+              <a:rPr lang="en-US" dirty="0" smtClean="0"/>
+              <a:t>the content of Build folder to &lt;</a:t>
             </a:r>
             <a:r>
               <a:rPr lang="en-US" dirty="0" err="1" smtClean="0"/>
@@ -4151,7 +4224,7 @@
             </a:r>
             <a:r>
               <a:rPr lang="en-US" dirty="0" smtClean="0"/>
-              <a:t>/ </a:t>
+              <a:t>/</a:t>
             </a:r>
             <a:r>
               <a:rPr lang="en-US" dirty="0" err="1" smtClean="0"/>
@@ -4197,7 +4270,19 @@
             </a:r>
             <a:r>
               <a:rPr lang="en-US" dirty="0" smtClean="0"/>
-              <a:t> class for implementation.</a:t>
+              <a:t> class for </a:t>
+            </a:r>
+            <a:r>
+              <a:rPr lang="en-US" dirty="0" smtClean="0"/>
+              <a:t>generated procedural mesh </a:t>
+            </a:r>
+            <a:r>
+              <a:rPr lang="en-US" dirty="0" smtClean="0"/>
+              <a:t>implementation</a:t>
+            </a:r>
+            <a:r>
+              <a:rPr lang="en-US" dirty="0" smtClean="0"/>
+              <a:t>.</a:t>
             </a:r>
           </a:p>
           <a:p>
@@ -4238,12 +4323,12 @@
               <a:t>. Run the game, The </a:t>
             </a:r>
             <a:r>
-              <a:rPr lang="en-US" dirty="0" err="1" smtClean="0"/>
-              <a:t>the</a:t>
-            </a:r>
-            <a:r>
-              <a:rPr lang="en-US" dirty="0" smtClean="0"/>
-              <a:t> GL application and then press Alt + A. Model will be generated in the game.</a:t>
+              <a:rPr lang="en-US" dirty="0" smtClean="0"/>
+              <a:t>GL </a:t>
+            </a:r>
+            <a:r>
+              <a:rPr lang="en-US" dirty="0" smtClean="0"/>
+              <a:t>application and then press Alt + A. Model will be generated in the game.</a:t>
             </a:r>
           </a:p>
           <a:p>

</xml_diff>